<commit_message>
coloring-connect.pptx simple-coloring.pptx stable-matching.pptx bipartite--matching.pptx
</commit_message>
<xml_diff>
--- a/spring12/slidesS12/coloring-connect.pptx
+++ b/spring12/slidesS12/coloring-connect.pptx
@@ -4121,7 +4121,11 @@
             </a:r>
             <a:r>
               <a:rPr lang="en-US" dirty="0" smtClean="0"/>
-              <a:t> 8F.</a:t>
+              <a:t> </a:t>
+            </a:r>
+            <a:r>
+              <a:rPr lang="en-US" dirty="0" smtClean="0"/>
+              <a:t>8M.</a:t>
             </a:r>
             <a:fld id="{FB5A61B2-F962-41D0-80C7-F5D7877F9E57}" type="slidenum">
               <a:rPr lang="en-US" smtClean="0"/>
@@ -4264,7 +4268,11 @@
             </a:r>
             <a:r>
               <a:rPr lang="en-US" dirty="0" smtClean="0"/>
-              <a:t> 8F.</a:t>
+              <a:t> </a:t>
+            </a:r>
+            <a:r>
+              <a:rPr lang="en-US" dirty="0" smtClean="0"/>
+              <a:t>8M.</a:t>
             </a:r>
             <a:fld id="{0D6CA1FB-2B00-4BCF-BEED-EFC5FEA944B9}" type="slidenum">
               <a:rPr lang="en-US" smtClean="0"/>
@@ -4355,7 +4363,11 @@
             </a:r>
             <a:r>
               <a:rPr lang="en-US" dirty="0" smtClean="0"/>
-              <a:t> 8F.</a:t>
+              <a:t> </a:t>
+            </a:r>
+            <a:r>
+              <a:rPr lang="en-US" dirty="0" smtClean="0"/>
+              <a:t>8M.</a:t>
             </a:r>
             <a:fld id="{57148ADA-680C-4144-AF16-33666242443F}" type="slidenum">
               <a:rPr lang="en-US" smtClean="0"/>
@@ -4423,7 +4435,11 @@
             </a:r>
             <a:r>
               <a:rPr lang="en-US" dirty="0" smtClean="0"/>
-              <a:t> 8F.</a:t>
+              <a:t> </a:t>
+            </a:r>
+            <a:r>
+              <a:rPr lang="en-US" dirty="0" smtClean="0"/>
+              <a:t>8M.</a:t>
             </a:r>
             <a:fld id="{6C799C0A-802F-41D9-B284-857975CDA7D3}" type="slidenum">
               <a:rPr lang="en-US" smtClean="0"/>
@@ -4635,14 +4651,10 @@
             </a:r>
             <a:r>
               <a:rPr lang="en-US" dirty="0" smtClean="0"/>
-              <a:t>8F</a:t>
-            </a:r>
-            <a:r>
-              <a:rPr lang="en-US" dirty="0"/>
-              <a:t>.</a:t>
+              <a:t>8M.</a:t>
             </a:r>
             <a:fld id="{A8DA7C4C-06CD-4825-9396-616D5C87571D}" type="slidenum">
-              <a:rPr lang="en-US"/>
+              <a:rPr lang="en-US" smtClean="0"/>
               <a:pPr>
                 <a:defRPr/>
               </a:pPr>
@@ -4868,10 +4880,10 @@
             </a:r>
             <a:r>
               <a:rPr lang="en-US" dirty="0" smtClean="0"/>
-              <a:t>8F.</a:t>
+              <a:t>8M.</a:t>
             </a:r>
             <a:fld id="{4F9003E0-E729-4FDF-81B9-7A17FBEA1067}" type="slidenum">
-              <a:rPr lang="en-US"/>
+              <a:rPr lang="en-US" smtClean="0"/>
               <a:pPr>
                 <a:defRPr/>
               </a:pPr>
@@ -5077,7 +5089,11 @@
             </a:r>
             <a:r>
               <a:rPr lang="en-US" dirty="0" smtClean="0"/>
-              <a:t> 8F.</a:t>
+              <a:t> </a:t>
+            </a:r>
+            <a:r>
+              <a:rPr lang="en-US" dirty="0" smtClean="0"/>
+              <a:t>8M.</a:t>
             </a:r>
             <a:fld id="{04EEC797-552D-4B57-982D-5930DB38F29A}" type="slidenum">
               <a:rPr lang="en-US"/>
@@ -5157,7 +5173,13 @@
               <a:rPr lang="en-US" sz="1200" dirty="0" smtClean="0">
                 <a:latin typeface="Comic Sans MS" pitchFamily="66" charset="0"/>
               </a:rPr>
-              <a:t>,    October 28</a:t>
+              <a:t>,    </a:t>
+            </a:r>
+            <a:r>
+              <a:rPr lang="en-US" sz="1200" dirty="0" smtClean="0">
+                <a:latin typeface="Comic Sans MS" pitchFamily="66" charset="0"/>
+              </a:rPr>
+              <a:t>April 2</a:t>
             </a:r>
             <a:r>
               <a:rPr lang="en-US" sz="1200" baseline="0" dirty="0" smtClean="0">
@@ -5169,7 +5191,7 @@
               <a:rPr lang="en-US" sz="1200" dirty="0" smtClean="0">
                 <a:latin typeface="Comic Sans MS" pitchFamily="66" charset="0"/>
               </a:rPr>
-              <a:t> 2011</a:t>
+              <a:t> 2012</a:t>
             </a:r>
             <a:endParaRPr lang="en-US" sz="1200" dirty="0">
               <a:latin typeface="Comic Sans MS" pitchFamily="66" charset="0"/>
@@ -5717,7 +5739,11 @@
             </a:r>
             <a:r>
               <a:rPr lang="en-US" dirty="0" smtClean="0"/>
-              <a:t> 8F.</a:t>
+              <a:t> </a:t>
+            </a:r>
+            <a:r>
+              <a:rPr lang="en-US" dirty="0" smtClean="0"/>
+              <a:t>8M.</a:t>
             </a:r>
             <a:fld id="{920DE7F4-CDF1-43A8-A3EC-2F119C2C0C6B}" type="slidenum">
               <a:rPr lang="en-US" smtClean="0"/>
@@ -7149,7 +7175,11 @@
             </a:r>
             <a:r>
               <a:rPr lang="en-US" dirty="0" smtClean="0"/>
-              <a:t> 8F.</a:t>
+              <a:t> </a:t>
+            </a:r>
+            <a:r>
+              <a:rPr lang="en-US" dirty="0" smtClean="0"/>
+              <a:t>8M.</a:t>
             </a:r>
             <a:fld id="{1096B1C8-3F49-4948-84A9-65877DEAA508}" type="slidenum">
               <a:rPr lang="en-US" smtClean="0"/>
@@ -7660,7 +7690,11 @@
             </a:r>
             <a:r>
               <a:rPr lang="en-US" dirty="0" smtClean="0"/>
-              <a:t> 8F.</a:t>
+              <a:t> </a:t>
+            </a:r>
+            <a:r>
+              <a:rPr lang="en-US" dirty="0" smtClean="0"/>
+              <a:t>8M.</a:t>
             </a:r>
             <a:fld id="{A1D5C815-3BBC-42B7-8185-9A7ED39F4870}" type="slidenum">
               <a:rPr lang="en-US" smtClean="0"/>
@@ -7910,7 +7944,11 @@
             </a:r>
             <a:r>
               <a:rPr lang="en-US" dirty="0" smtClean="0"/>
-              <a:t> 8F.</a:t>
+              <a:t> </a:t>
+            </a:r>
+            <a:r>
+              <a:rPr lang="en-US" dirty="0" smtClean="0"/>
+              <a:t>8M.</a:t>
             </a:r>
             <a:fld id="{E26A2DF8-0AA4-4DFA-8D03-C7F13142A2C2}" type="slidenum">
               <a:rPr lang="en-US" smtClean="0"/>
@@ -9018,7 +9056,11 @@
             </a:r>
             <a:r>
               <a:rPr lang="en-US" dirty="0" smtClean="0"/>
-              <a:t> 8F.</a:t>
+              <a:t> </a:t>
+            </a:r>
+            <a:r>
+              <a:rPr lang="en-US" dirty="0" smtClean="0"/>
+              <a:t>8M.</a:t>
             </a:r>
             <a:fld id="{0F6E8C09-53CB-4C06-9E92-F0B3AEE0D3D5}" type="slidenum">
               <a:rPr lang="en-US" smtClean="0"/>
@@ -9519,7 +9561,11 @@
             </a:r>
             <a:r>
               <a:rPr lang="en-US" dirty="0" smtClean="0"/>
-              <a:t> 8F.</a:t>
+              <a:t> </a:t>
+            </a:r>
+            <a:r>
+              <a:rPr lang="en-US" dirty="0" smtClean="0"/>
+              <a:t>8M.</a:t>
             </a:r>
             <a:fld id="{16DA4035-491B-488D-BEBD-EFE2FD596243}" type="slidenum">
               <a:rPr lang="en-US" smtClean="0"/>
@@ -10049,7 +10095,11 @@
             </a:r>
             <a:r>
               <a:rPr lang="en-US" dirty="0" smtClean="0"/>
-              <a:t> 8F.</a:t>
+              <a:t> </a:t>
+            </a:r>
+            <a:r>
+              <a:rPr lang="en-US" dirty="0" smtClean="0"/>
+              <a:t>8M.</a:t>
             </a:r>
             <a:fld id="{C1F5F56B-8BAF-4761-B946-3F4570916247}" type="slidenum">
               <a:rPr lang="en-US" smtClean="0"/>
@@ -12170,7 +12220,11 @@
             </a:r>
             <a:r>
               <a:rPr lang="en-US" dirty="0" smtClean="0"/>
-              <a:t> 8F.</a:t>
+              <a:t> </a:t>
+            </a:r>
+            <a:r>
+              <a:rPr lang="en-US" dirty="0" smtClean="0"/>
+              <a:t>8M.</a:t>
             </a:r>
             <a:fld id="{25F652F5-CA01-4A91-AD70-A2B3B3C8B117}" type="slidenum">
               <a:rPr lang="en-US" smtClean="0"/>
@@ -13876,7 +13930,11 @@
             </a:r>
             <a:r>
               <a:rPr lang="en-US" dirty="0" smtClean="0"/>
-              <a:t> 8F.</a:t>
+              <a:t> </a:t>
+            </a:r>
+            <a:r>
+              <a:rPr lang="en-US" dirty="0" smtClean="0"/>
+              <a:t>8M.</a:t>
             </a:r>
             <a:fld id="{06D699BA-3F76-4CED-8FF3-F27225CEE379}" type="slidenum">
               <a:rPr lang="en-US" smtClean="0"/>
@@ -15443,7 +15501,11 @@
             </a:r>
             <a:r>
               <a:rPr lang="en-US" dirty="0" smtClean="0"/>
-              <a:t> 8F.</a:t>
+              <a:t> </a:t>
+            </a:r>
+            <a:r>
+              <a:rPr lang="en-US" dirty="0" smtClean="0"/>
+              <a:t>8M.</a:t>
             </a:r>
             <a:fld id="{8DADB515-19DF-404E-9309-B12613324AB4}" type="slidenum">
               <a:rPr lang="en-US" smtClean="0"/>
@@ -16809,7 +16871,11 @@
             </a:r>
             <a:r>
               <a:rPr lang="en-US" dirty="0" smtClean="0"/>
-              <a:t> 8F.</a:t>
+              <a:t> </a:t>
+            </a:r>
+            <a:r>
+              <a:rPr lang="en-US" dirty="0" smtClean="0"/>
+              <a:t>8M.</a:t>
             </a:r>
             <a:fld id="{34C693FC-8972-4A16-8945-AB2B38620F04}" type="slidenum">
               <a:rPr lang="en-US" smtClean="0"/>
@@ -17412,7 +17478,11 @@
             </a:r>
             <a:r>
               <a:rPr lang="en-US" dirty="0" smtClean="0"/>
-              <a:t> 8F.</a:t>
+              <a:t> </a:t>
+            </a:r>
+            <a:r>
+              <a:rPr lang="en-US" dirty="0" smtClean="0"/>
+              <a:t>8M.</a:t>
             </a:r>
             <a:fld id="{30A26BC1-508A-43F3-AC00-520955D5F248}" type="slidenum">
               <a:rPr lang="en-US" smtClean="0"/>
@@ -17581,7 +17651,7 @@
           <a:graphicData uri="http://schemas.openxmlformats.org/presentationml/2006/ole">
             <mc:AlternateContent xmlns:mc="http://schemas.openxmlformats.org/markup-compatibility/2006">
               <mc:Choice xmlns:v="urn:schemas-microsoft-com:vml" Requires="v">
-                <p:oleObj spid="_x0000_s81937" name="Equation" r:id="rId4" imgW="914400" imgH="198720" progId="Equation.DSMT4">
+                <p:oleObj spid="_x0000_s81939" name="Equation" r:id="rId4" imgW="914400" imgH="198720" progId="Equation.DSMT4">
                   <p:embed/>
                 </p:oleObj>
               </mc:Choice>
@@ -17708,7 +17778,11 @@
             </a:r>
             <a:r>
               <a:rPr lang="en-US" dirty="0" smtClean="0"/>
-              <a:t> 8F.</a:t>
+              <a:t> </a:t>
+            </a:r>
+            <a:r>
+              <a:rPr lang="en-US" dirty="0" smtClean="0"/>
+              <a:t>8M.</a:t>
             </a:r>
             <a:fld id="{FE5E70CC-87D8-4C86-AAD3-C1CC9C0628A2}" type="slidenum">
               <a:rPr lang="en-US" smtClean="0"/>
@@ -18230,7 +18304,11 @@
             </a:r>
             <a:r>
               <a:rPr lang="en-US" dirty="0" smtClean="0"/>
-              <a:t> 8F.</a:t>
+              <a:t> </a:t>
+            </a:r>
+            <a:r>
+              <a:rPr lang="en-US" dirty="0" smtClean="0"/>
+              <a:t>8M.</a:t>
             </a:r>
             <a:fld id="{9CE1D6F8-EA8B-42BD-B52E-BC0A6BBDB8E7}" type="slidenum">
               <a:rPr lang="en-US" smtClean="0"/>
@@ -19631,7 +19709,11 @@
             </a:r>
             <a:r>
               <a:rPr lang="en-US" dirty="0" smtClean="0"/>
-              <a:t> 8F.</a:t>
+              <a:t> </a:t>
+            </a:r>
+            <a:r>
+              <a:rPr lang="en-US" dirty="0" smtClean="0"/>
+              <a:t>8M.</a:t>
             </a:r>
             <a:fld id="{019D441C-1CEE-4815-8AD1-DB5595D7D0CF}" type="slidenum">
               <a:rPr lang="en-US" smtClean="0"/>
@@ -21021,7 +21103,11 @@
             </a:r>
             <a:r>
               <a:rPr lang="en-US" dirty="0" smtClean="0"/>
-              <a:t> 8F.</a:t>
+              <a:t> </a:t>
+            </a:r>
+            <a:r>
+              <a:rPr lang="en-US" dirty="0" smtClean="0"/>
+              <a:t>8M.</a:t>
             </a:r>
             <a:fld id="{510E51B6-39DF-4A40-B05C-BBC34346DAE0}" type="slidenum">
               <a:rPr lang="en-US" smtClean="0"/>
@@ -21467,7 +21553,11 @@
             </a:r>
             <a:r>
               <a:rPr lang="en-US" dirty="0" smtClean="0"/>
-              <a:t> 8F.</a:t>
+              <a:t> </a:t>
+            </a:r>
+            <a:r>
+              <a:rPr lang="en-US" dirty="0" smtClean="0"/>
+              <a:t>8M.</a:t>
             </a:r>
             <a:fld id="{D5668235-E03E-4605-947B-4EFCEE6AD827}" type="slidenum">
               <a:rPr lang="en-US" smtClean="0"/>
@@ -21855,7 +21945,11 @@
             </a:r>
             <a:r>
               <a:rPr lang="en-US" dirty="0" smtClean="0"/>
-              <a:t> 8F.</a:t>
+              <a:t> </a:t>
+            </a:r>
+            <a:r>
+              <a:rPr lang="en-US" dirty="0" smtClean="0"/>
+              <a:t>8M.</a:t>
             </a:r>
             <a:fld id="{E8C0CA2E-CEA8-406D-BF7C-40C36FC3A25B}" type="slidenum">
               <a:rPr lang="en-US" smtClean="0"/>
@@ -22129,7 +22223,11 @@
             </a:r>
             <a:r>
               <a:rPr lang="en-US" dirty="0" smtClean="0"/>
-              <a:t> 8F.</a:t>
+              <a:t> </a:t>
+            </a:r>
+            <a:r>
+              <a:rPr lang="en-US" dirty="0" smtClean="0"/>
+              <a:t>8M.</a:t>
             </a:r>
             <a:fld id="{22566D6A-3198-4289-99D7-241FB68E31EB}" type="slidenum">
               <a:rPr lang="en-US" smtClean="0"/>
@@ -23632,7 +23730,11 @@
             </a:r>
             <a:r>
               <a:rPr lang="en-US" dirty="0" smtClean="0"/>
-              <a:t> 8F.</a:t>
+              <a:t> </a:t>
+            </a:r>
+            <a:r>
+              <a:rPr lang="en-US" dirty="0" smtClean="0"/>
+              <a:t>8M.</a:t>
             </a:r>
             <a:fld id="{2AA0A689-E25D-4F86-90AF-6C007F5FC4CA}" type="slidenum">
               <a:rPr lang="en-US" smtClean="0"/>
@@ -24056,7 +24158,7 @@
           <a:graphicData uri="http://schemas.openxmlformats.org/presentationml/2006/ole">
             <mc:AlternateContent xmlns:mc="http://schemas.openxmlformats.org/markup-compatibility/2006">
               <mc:Choice xmlns:v="urn:schemas-microsoft-com:vml" Requires="v">
-                <p:oleObj spid="_x0000_s5137" name="Equation" r:id="rId4" imgW="1904760" imgH="279360" progId="Equation.DSMT4">
+                <p:oleObj spid="_x0000_s5139" name="Equation" r:id="rId4" imgW="1904760" imgH="279360" progId="Equation.DSMT4">
                   <p:embed/>
                 </p:oleObj>
               </mc:Choice>
@@ -24133,7 +24235,11 @@
             </a:r>
             <a:r>
               <a:rPr lang="en-US" dirty="0" smtClean="0"/>
-              <a:t> 8F.</a:t>
+              <a:t> </a:t>
+            </a:r>
+            <a:r>
+              <a:rPr lang="en-US" dirty="0" smtClean="0"/>
+              <a:t>8M.</a:t>
             </a:r>
             <a:fld id="{80DF07F0-4624-407F-A2EA-092845FC7F42}" type="slidenum">
               <a:rPr lang="en-US" smtClean="0"/>
@@ -24387,7 +24493,11 @@
             </a:r>
             <a:r>
               <a:rPr lang="en-US" dirty="0" smtClean="0"/>
-              <a:t> 8F.</a:t>
+              <a:t> </a:t>
+            </a:r>
+            <a:r>
+              <a:rPr lang="en-US" dirty="0" smtClean="0"/>
+              <a:t>8M.</a:t>
             </a:r>
             <a:fld id="{D0DFB3D4-A8AF-4261-BAED-EDE6AD83D9CA}" type="slidenum">
               <a:rPr lang="en-US" smtClean="0"/>
@@ -25359,7 +25469,11 @@
             </a:r>
             <a:r>
               <a:rPr lang="en-US" dirty="0" smtClean="0"/>
-              <a:t> 8F.</a:t>
+              <a:t> </a:t>
+            </a:r>
+            <a:r>
+              <a:rPr lang="en-US" dirty="0" smtClean="0"/>
+              <a:t>8M.</a:t>
             </a:r>
             <a:fld id="{6823D3A2-D6E2-4178-848E-465056A76568}" type="slidenum">
               <a:rPr lang="en-US" smtClean="0"/>
@@ -25685,7 +25799,11 @@
             </a:r>
             <a:r>
               <a:rPr lang="en-US" dirty="0" smtClean="0"/>
-              <a:t> 8F.</a:t>
+              <a:t> </a:t>
+            </a:r>
+            <a:r>
+              <a:rPr lang="en-US" dirty="0" smtClean="0"/>
+              <a:t>8M.</a:t>
             </a:r>
             <a:fld id="{17A61DB4-1F4E-47C2-980D-83A2F3996CEC}" type="slidenum">
               <a:rPr lang="en-US" smtClean="0"/>
@@ -26634,7 +26752,11 @@
             </a:r>
             <a:r>
               <a:rPr lang="en-US" dirty="0" smtClean="0"/>
-              <a:t> 8F.</a:t>
+              <a:t> </a:t>
+            </a:r>
+            <a:r>
+              <a:rPr lang="en-US" dirty="0" smtClean="0"/>
+              <a:t>8M.</a:t>
             </a:r>
             <a:fld id="{43E12C49-E36A-496C-9DCA-6E960B9FC41B}" type="slidenum">
               <a:rPr lang="en-US" smtClean="0"/>
@@ -27458,7 +27580,11 @@
             </a:r>
             <a:r>
               <a:rPr lang="en-US" dirty="0" smtClean="0"/>
-              <a:t> 8F.</a:t>
+              <a:t> </a:t>
+            </a:r>
+            <a:r>
+              <a:rPr lang="en-US" dirty="0" smtClean="0"/>
+              <a:t>8M.</a:t>
             </a:r>
             <a:fld id="{43E12C49-E36A-496C-9DCA-6E960B9FC41B}" type="slidenum">
               <a:rPr lang="en-US" smtClean="0"/>
@@ -28946,7 +29072,11 @@
             </a:r>
             <a:r>
               <a:rPr lang="en-US" dirty="0" smtClean="0"/>
-              <a:t> 8F.</a:t>
+              <a:t> </a:t>
+            </a:r>
+            <a:r>
+              <a:rPr lang="en-US" dirty="0" smtClean="0"/>
+              <a:t>8M.</a:t>
             </a:r>
             <a:fld id="{43E12C49-E36A-496C-9DCA-6E960B9FC41B}" type="slidenum">
               <a:rPr lang="en-US" smtClean="0"/>
@@ -30462,7 +30592,11 @@
             </a:r>
             <a:r>
               <a:rPr lang="en-US" dirty="0" smtClean="0"/>
-              <a:t> 8F.</a:t>
+              <a:t> </a:t>
+            </a:r>
+            <a:r>
+              <a:rPr lang="en-US" dirty="0" smtClean="0"/>
+              <a:t>8M.</a:t>
             </a:r>
             <a:fld id="{43E12C49-E36A-496C-9DCA-6E960B9FC41B}" type="slidenum">
               <a:rPr lang="en-US" smtClean="0"/>
@@ -30970,7 +31104,11 @@
             </a:r>
             <a:r>
               <a:rPr lang="en-US" dirty="0" smtClean="0"/>
-              <a:t> 8F.</a:t>
+              <a:t> </a:t>
+            </a:r>
+            <a:r>
+              <a:rPr lang="en-US" dirty="0" smtClean="0"/>
+              <a:t>8M.</a:t>
             </a:r>
             <a:fld id="{C61CA234-7FC4-4D7E-8CCC-AC6F555EE6FA}" type="slidenum">
               <a:rPr lang="en-US" smtClean="0"/>
@@ -31042,7 +31180,11 @@
             </a:r>
             <a:r>
               <a:rPr lang="en-US" dirty="0" smtClean="0"/>
-              <a:t> 8F.</a:t>
+              <a:t> </a:t>
+            </a:r>
+            <a:r>
+              <a:rPr lang="en-US" dirty="0" smtClean="0"/>
+              <a:t>8M.</a:t>
             </a:r>
             <a:fld id="{0D6CA1FB-2B00-4BCF-BEED-EFC5FEA944B9}" type="slidenum">
               <a:rPr lang="en-US" smtClean="0"/>
@@ -32044,7 +32186,11 @@
             </a:r>
             <a:r>
               <a:rPr lang="en-US" dirty="0" smtClean="0"/>
-              <a:t> 8F.</a:t>
+              <a:t> </a:t>
+            </a:r>
+            <a:r>
+              <a:rPr lang="en-US" dirty="0" smtClean="0"/>
+              <a:t>8M.</a:t>
             </a:r>
             <a:fld id="{43E12C49-E36A-496C-9DCA-6E960B9FC41B}" type="slidenum">
               <a:rPr lang="en-US" smtClean="0"/>
@@ -32893,7 +33039,11 @@
             </a:r>
             <a:r>
               <a:rPr lang="en-US" dirty="0" smtClean="0"/>
-              <a:t> 8F.</a:t>
+              <a:t> </a:t>
+            </a:r>
+            <a:r>
+              <a:rPr lang="en-US" dirty="0" smtClean="0"/>
+              <a:t>8M.</a:t>
             </a:r>
             <a:fld id="{E0862B09-D28A-4DC1-8DF8-9F3B5AF8E2FB}" type="slidenum">
               <a:rPr lang="en-US" smtClean="0"/>
@@ -33207,13 +33357,13 @@
   <p:clrMapOvr>
     <a:masterClrMapping/>
   </p:clrMapOvr>
-  <mc:AlternateContent xmlns:mc="http://schemas.openxmlformats.org/markup-compatibility/2006">
-    <mc:Choice xmlns:p14="http://schemas.microsoft.com/office/powerpoint/2010/main" Requires="p14">
+  <mc:AlternateContent xmlns:mc="http://schemas.openxmlformats.org/markup-compatibility/2006" xmlns:p14="http://schemas.microsoft.com/office/powerpoint/2010/main">
+    <mc:Choice Requires="p14">
       <p:transition spd="med" p14:dur="700">
         <p:fade thruBlk="1"/>
       </p:transition>
     </mc:Choice>
-    <mc:Fallback>
+    <mc:Fallback xmlns="">
       <p:transition xmlns:p14="http://schemas.microsoft.com/office/powerpoint/2010/main" spd="med">
         <p:fade thruBlk="1"/>
       </p:transition>
@@ -33882,7 +34032,11 @@
             </a:r>
             <a:r>
               <a:rPr lang="en-US" dirty="0" smtClean="0"/>
-              <a:t> 8F.</a:t>
+              <a:t> </a:t>
+            </a:r>
+            <a:r>
+              <a:rPr lang="en-US" dirty="0" smtClean="0"/>
+              <a:t>8M.</a:t>
             </a:r>
             <a:fld id="{C5ED6093-0525-4400-8A6A-E4043F6EDA8D}" type="slidenum">
               <a:rPr lang="en-US" smtClean="0"/>
@@ -34971,7 +35125,11 @@
             </a:r>
             <a:r>
               <a:rPr lang="en-US" dirty="0" smtClean="0"/>
-              <a:t> 8F.</a:t>
+              <a:t> </a:t>
+            </a:r>
+            <a:r>
+              <a:rPr lang="en-US" dirty="0" smtClean="0"/>
+              <a:t>8M.</a:t>
             </a:r>
             <a:fld id="{BECF6E19-73B2-41AB-9011-DA48DCC943F0}" type="slidenum">
               <a:rPr lang="en-US" smtClean="0"/>
@@ -35238,7 +35396,11 @@
             </a:r>
             <a:r>
               <a:rPr lang="en-US" dirty="0" smtClean="0"/>
-              <a:t> 8F.</a:t>
+              <a:t> </a:t>
+            </a:r>
+            <a:r>
+              <a:rPr lang="en-US" dirty="0" smtClean="0"/>
+              <a:t>8M.</a:t>
             </a:r>
             <a:fld id="{D6F71EAE-C170-414A-A6BE-2B5CA14D8D92}" type="slidenum">
               <a:rPr lang="en-US" smtClean="0"/>
@@ -36773,7 +36935,11 @@
             </a:r>
             <a:r>
               <a:rPr lang="en-US" dirty="0" smtClean="0"/>
-              <a:t> 8F.</a:t>
+              <a:t> </a:t>
+            </a:r>
+            <a:r>
+              <a:rPr lang="en-US" dirty="0" smtClean="0"/>
+              <a:t>8M.</a:t>
             </a:r>
             <a:fld id="{D1606E76-A6F7-4683-9B12-9E087518A6C4}" type="slidenum">
               <a:rPr lang="en-US" smtClean="0"/>
@@ -38299,7 +38465,11 @@
             </a:r>
             <a:r>
               <a:rPr lang="en-US" dirty="0" smtClean="0"/>
-              <a:t> 8F.</a:t>
+              <a:t> </a:t>
+            </a:r>
+            <a:r>
+              <a:rPr lang="en-US" dirty="0" smtClean="0"/>
+              <a:t>8M.</a:t>
             </a:r>
             <a:fld id="{5F1FD0E7-2BA5-4C63-8098-F979477CC80E}" type="slidenum">
               <a:rPr lang="en-US" smtClean="0"/>
@@ -38586,7 +38756,11 @@
             </a:r>
             <a:r>
               <a:rPr lang="en-US" dirty="0" smtClean="0"/>
-              <a:t> 8F.</a:t>
+              <a:t> </a:t>
+            </a:r>
+            <a:r>
+              <a:rPr lang="en-US" dirty="0" smtClean="0"/>
+              <a:t>8M.</a:t>
             </a:r>
             <a:fld id="{2086E495-F989-4870-B295-EA8FDDA02962}" type="slidenum">
               <a:rPr lang="en-US" smtClean="0"/>

</xml_diff>